<commit_message>
add R and SPSS code for independent and dependent t -test
</commit_message>
<xml_diff>
--- a/Lecture 13_Confidence interval/Lecture 13_confidence interval.pptx
+++ b/Lecture 13_Confidence interval/Lecture 13_confidence interval.pptx
@@ -135,7 +135,7 @@
   </p:defaultTextStyle>
   <p:extLst>
     <p:ext uri="{EFAFB233-063F-42B5-8137-9DF3F51BA10A}">
-      <p15:sldGuideLst xmlns:p15="http://schemas.microsoft.com/office/powerpoint/2012/main" xmlns="">
+      <p15:sldGuideLst xmlns="" xmlns:p15="http://schemas.microsoft.com/office/powerpoint/2012/main">
         <p15:guide id="1" orient="horz" pos="2160">
           <p15:clr>
             <a:srgbClr val="A4A3A4"/>
@@ -234,7 +234,7 @@
           <a:p>
             <a:fld id="{DDC19DAE-F421-4B83-AF6F-354145FD3FB4}" type="datetimeFigureOut">
               <a:rPr lang="en-US" smtClean="0"/>
-              <a:t>3/27/18</a:t>
+              <a:t>4/3/18</a:t>
             </a:fld>
             <a:endParaRPr lang="en-US"/>
           </a:p>
@@ -1609,7 +1609,7 @@
           <a:p>
             <a:fld id="{1EC348BC-EAD5-416F-A396-0B364132653C}" type="datetime1">
               <a:rPr lang="en-US" smtClean="0"/>
-              <a:t>3/27/18</a:t>
+              <a:t>4/3/18</a:t>
             </a:fld>
             <a:endParaRPr lang="en-US"/>
           </a:p>
@@ -1777,7 +1777,7 @@
           <a:p>
             <a:fld id="{3C6E73F4-B72C-4287-A340-1B6549AADC45}" type="datetime1">
               <a:rPr lang="en-US" smtClean="0"/>
-              <a:t>3/27/18</a:t>
+              <a:t>4/3/18</a:t>
             </a:fld>
             <a:endParaRPr lang="en-US"/>
           </a:p>
@@ -1955,7 +1955,7 @@
           <a:p>
             <a:fld id="{168A3E7B-A300-4342-835A-5799AF340D76}" type="datetime1">
               <a:rPr lang="en-US" smtClean="0"/>
-              <a:t>3/27/18</a:t>
+              <a:t>4/3/18</a:t>
             </a:fld>
             <a:endParaRPr lang="en-US"/>
           </a:p>
@@ -2123,7 +2123,7 @@
           <a:p>
             <a:fld id="{1497E54F-C52A-429D-BBE2-90BBD26F51BB}" type="datetime1">
               <a:rPr lang="en-US" smtClean="0"/>
-              <a:t>3/27/18</a:t>
+              <a:t>4/3/18</a:t>
             </a:fld>
             <a:endParaRPr lang="en-US"/>
           </a:p>
@@ -2368,7 +2368,7 @@
           <a:p>
             <a:fld id="{52CD5DB1-690B-4F50-9529-18B8B796E952}" type="datetime1">
               <a:rPr lang="en-US" smtClean="0"/>
-              <a:t>3/27/18</a:t>
+              <a:t>4/3/18</a:t>
             </a:fld>
             <a:endParaRPr lang="en-US"/>
           </a:p>
@@ -2653,7 +2653,7 @@
           <a:p>
             <a:fld id="{09A389DF-6D12-4D44-BF58-13B38A50B6D7}" type="datetime1">
               <a:rPr lang="en-US" smtClean="0"/>
-              <a:t>3/27/18</a:t>
+              <a:t>4/3/18</a:t>
             </a:fld>
             <a:endParaRPr lang="en-US"/>
           </a:p>
@@ -3072,7 +3072,7 @@
           <a:p>
             <a:fld id="{FEB95709-B389-4A31-A335-4A071080E6A8}" type="datetime1">
               <a:rPr lang="en-US" smtClean="0"/>
-              <a:t>3/27/18</a:t>
+              <a:t>4/3/18</a:t>
             </a:fld>
             <a:endParaRPr lang="en-US"/>
           </a:p>
@@ -3189,7 +3189,7 @@
           <a:p>
             <a:fld id="{91514DB5-E0BE-41C0-8A27-DEF17DEB6233}" type="datetime1">
               <a:rPr lang="en-US" smtClean="0"/>
-              <a:t>3/27/18</a:t>
+              <a:t>4/3/18</a:t>
             </a:fld>
             <a:endParaRPr lang="en-US"/>
           </a:p>
@@ -3284,7 +3284,7 @@
           <a:p>
             <a:fld id="{88A83AC6-E656-4240-BB13-B2170191F3BB}" type="datetime1">
               <a:rPr lang="en-US" smtClean="0"/>
-              <a:t>3/27/18</a:t>
+              <a:t>4/3/18</a:t>
             </a:fld>
             <a:endParaRPr lang="en-US"/>
           </a:p>
@@ -3559,7 +3559,7 @@
           <a:p>
             <a:fld id="{1323A2FE-49B9-4741-AB4C-59C3D5648B31}" type="datetime1">
               <a:rPr lang="en-US" smtClean="0"/>
-              <a:t>3/27/18</a:t>
+              <a:t>4/3/18</a:t>
             </a:fld>
             <a:endParaRPr lang="en-US"/>
           </a:p>
@@ -3811,7 +3811,7 @@
           <a:p>
             <a:fld id="{F700E7DE-5A04-43D1-9717-612C257ADBEF}" type="datetime1">
               <a:rPr lang="en-US" smtClean="0"/>
-              <a:t>3/27/18</a:t>
+              <a:t>4/3/18</a:t>
             </a:fld>
             <a:endParaRPr lang="en-US"/>
           </a:p>
@@ -4022,7 +4022,7 @@
           <a:p>
             <a:fld id="{E4959594-99A2-4C71-9FA1-358E4142533F}" type="datetime1">
               <a:rPr lang="en-US" smtClean="0"/>
-              <a:t>3/27/18</a:t>
+              <a:t>4/3/18</a:t>
             </a:fld>
             <a:endParaRPr lang="en-US"/>
           </a:p>
@@ -4935,7 +4935,7 @@
           <a:graphicData uri="http://schemas.openxmlformats.org/presentationml/2006/ole">
             <mc:AlternateContent xmlns:mc="http://schemas.openxmlformats.org/markup-compatibility/2006">
               <mc:Choice xmlns:v="urn:schemas-microsoft-com:vml" Requires="v">
-                <p:oleObj spid="_x0000_s4132" name="Equation" r:id="rId3" imgW="965160" imgH="419040" progId="Equation.DSMT4">
+                <p:oleObj spid="_x0000_s4142" name="Equation" r:id="rId3" imgW="965160" imgH="419040" progId="Equation.DSMT4">
                   <p:embed/>
                 </p:oleObj>
               </mc:Choice>
@@ -5518,7 +5518,7 @@
                   <a:t> police officers have a mean score of </a:t>
                 </a:r>
                 <a14:m>
-                  <m:oMath xmlns:m="http://schemas.openxmlformats.org/officeDocument/2006/math" xmlns="">
+                  <m:oMath xmlns="" xmlns:m="http://schemas.openxmlformats.org/officeDocument/2006/math">
                     <m:acc>
                       <m:accPr>
                         <m:chr m:val="̅"/>
@@ -5605,7 +5605,7 @@
           <a:graphicData uri="http://schemas.openxmlformats.org/presentationml/2006/ole">
             <mc:AlternateContent xmlns:mc="http://schemas.openxmlformats.org/markup-compatibility/2006">
               <mc:Choice xmlns:v="urn:schemas-microsoft-com:vml" Requires="v">
-                <p:oleObj spid="_x0000_s5155" name="Equation" r:id="rId4" imgW="583920" imgH="203040" progId="Equation.DSMT4">
+                <p:oleObj spid="_x0000_s5165" name="Equation" r:id="rId4" imgW="583920" imgH="203040" progId="Equation.DSMT4">
                   <p:embed/>
                 </p:oleObj>
               </mc:Choice>
@@ -5768,7 +5768,7 @@
                   <a:t> police officers have a mean score of </a:t>
                 </a:r>
                 <a14:m>
-                  <m:oMath xmlns:m="http://schemas.openxmlformats.org/officeDocument/2006/math" xmlns="">
+                  <m:oMath xmlns="" xmlns:m="http://schemas.openxmlformats.org/officeDocument/2006/math">
                     <m:acc>
                       <m:accPr>
                         <m:chr m:val="̅"/>
@@ -5871,7 +5871,7 @@
           <a:graphicData uri="http://schemas.openxmlformats.org/presentationml/2006/ole">
             <mc:AlternateContent xmlns:mc="http://schemas.openxmlformats.org/markup-compatibility/2006">
               <mc:Choice xmlns:v="urn:schemas-microsoft-com:vml" Requires="v">
-                <p:oleObj spid="_x0000_s8207" name="Equation" r:id="rId4" imgW="583920" imgH="203040" progId="Equation.DSMT4">
+                <p:oleObj spid="_x0000_s8226" name="Equation" r:id="rId4" imgW="583920" imgH="203040" progId="Equation.DSMT4">
                   <p:embed/>
                 </p:oleObj>
               </mc:Choice>
@@ -5958,7 +5958,7 @@
           <a:graphicData uri="http://schemas.openxmlformats.org/presentationml/2006/ole">
             <mc:AlternateContent xmlns:mc="http://schemas.openxmlformats.org/markup-compatibility/2006">
               <mc:Choice xmlns:v="urn:schemas-microsoft-com:vml" Requires="v">
-                <p:oleObj spid="_x0000_s8208" name="Equation" r:id="rId6" imgW="3276360" imgH="419040" progId="Equation.DSMT4">
+                <p:oleObj spid="_x0000_s8227" name="Equation" r:id="rId6" imgW="3276360" imgH="419040" progId="Equation.DSMT4">
                   <p:embed/>
                 </p:oleObj>
               </mc:Choice>
@@ -6270,7 +6270,7 @@
               <a:p>
                 <a:pPr lvl="1"/>
                 <a14:m>
-                  <m:oMath xmlns:m="http://schemas.openxmlformats.org/officeDocument/2006/math" xmlns="">
+                  <m:oMath xmlns="" xmlns:m="http://schemas.openxmlformats.org/officeDocument/2006/math">
                     <m:acc>
                       <m:accPr>
                         <m:chr m:val="̅"/>
@@ -6307,7 +6307,7 @@
                   <a:t>Standard error = </a:t>
                 </a:r>
                 <a14:m>
-                  <m:oMath xmlns:m="http://schemas.openxmlformats.org/officeDocument/2006/math" xmlns="">
+                  <m:oMath xmlns="" xmlns:m="http://schemas.openxmlformats.org/officeDocument/2006/math">
                     <m:f>
                       <m:fPr>
                         <m:type m:val="skw"/>
@@ -6354,7 +6354,7 @@
                   <a:t>=</a:t>
                 </a:r>
                 <a14:m>
-                  <m:oMath xmlns:m="http://schemas.openxmlformats.org/officeDocument/2006/math" xmlns="">
+                  <m:oMath xmlns="" xmlns:m="http://schemas.openxmlformats.org/officeDocument/2006/math">
                     <m:f>
                       <m:fPr>
                         <m:type m:val="skw"/>
@@ -8138,7 +8138,7 @@
           <a:graphicData uri="http://schemas.openxmlformats.org/presentationml/2006/ole">
             <mc:AlternateContent xmlns:mc="http://schemas.openxmlformats.org/markup-compatibility/2006">
               <mc:Choice xmlns:v="urn:schemas-microsoft-com:vml" Requires="v">
-                <p:oleObj spid="_x0000_s7192" name="Equation" r:id="rId4" imgW="711000" imgH="431640" progId="Equation.DSMT4">
+                <p:oleObj spid="_x0000_s7202" name="Equation" r:id="rId4" imgW="711000" imgH="431640" progId="Equation.DSMT4">
                   <p:embed/>
                 </p:oleObj>
               </mc:Choice>
@@ -9798,7 +9798,7 @@
                   <a:t>Example: suppose we want to estimate the average SAT score. Let us select 225 students, and there average score is </a:t>
                 </a:r>
                 <a14:m>
-                  <m:oMath xmlns:m="http://schemas.openxmlformats.org/officeDocument/2006/math" xmlns="">
+                  <m:oMath xmlns="" xmlns:m="http://schemas.openxmlformats.org/officeDocument/2006/math">
                     <m:acc>
                       <m:accPr>
                         <m:chr m:val="̅"/>
@@ -9915,7 +9915,7 @@
           <a:graphicData uri="http://schemas.openxmlformats.org/presentationml/2006/ole">
             <mc:AlternateContent xmlns:mc="http://schemas.openxmlformats.org/markup-compatibility/2006">
               <mc:Choice xmlns:v="urn:schemas-microsoft-com:vml" Requires="v">
-                <p:oleObj spid="_x0000_s3124" name="Equation" r:id="rId5" imgW="228600" imgH="228600" progId="Equation.DSMT4">
+                <p:oleObj spid="_x0000_s3134" name="Equation" r:id="rId5" imgW="228600" imgH="228600" progId="Equation.DSMT4">
                   <p:embed/>
                 </p:oleObj>
               </mc:Choice>
@@ -10207,7 +10207,7 @@
           <a:graphicData uri="http://schemas.openxmlformats.org/presentationml/2006/ole">
             <mc:AlternateContent xmlns:mc="http://schemas.openxmlformats.org/markup-compatibility/2006">
               <mc:Choice xmlns:v="urn:schemas-microsoft-com:vml" Requires="v">
-                <p:oleObj spid="_x0000_s2105" name="Equation" r:id="rId4" imgW="2400120" imgH="457200" progId="Equation.DSMT4">
+                <p:oleObj spid="_x0000_s2115" name="Equation" r:id="rId4" imgW="2400120" imgH="457200" progId="Equation.DSMT4">
                   <p:embed/>
                 </p:oleObj>
               </mc:Choice>
@@ -10410,14 +10410,7 @@
                   <a:rPr lang="en-US" sz="2400" dirty="0">
                     <a:latin typeface="Palatino Linotype" pitchFamily="18" charset="0"/>
                   </a:rPr>
-                  <a:t>-1.96</a:t>
-                </a:r>
-                <a14:m/>
-                <a:r>
-                  <a:rPr lang="en-US" sz="2400" dirty="0">
-                    <a:latin typeface="Palatino Linotype" pitchFamily="18" charset="0"/>
-                  </a:rPr>
-                  <a:t>] is 0.95.</a:t>
+                  <a:t>-1.96] is 0.95.</a:t>
                 </a:r>
               </a:p>
               <a:p>
@@ -10455,7 +10448,6 @@
                   <a:rPr lang="en-US" sz="2400" dirty="0"/>
                   <a:t> </a:t>
                 </a:r>
-                <a14:m/>
                 <a:r>
                   <a:rPr lang="en-US" sz="2400" dirty="0">
                     <a:latin typeface="Palatino Linotype" pitchFamily="18" charset="0"/>
@@ -10472,21 +10464,7 @@
                   <a:rPr lang="en-US" sz="2400" dirty="0">
                     <a:latin typeface="Palatino Linotype" pitchFamily="18" charset="0"/>
                   </a:rPr>
-                  <a:t> is [</a:t>
-                </a:r>
-                <a14:m/>
-                <a:r>
-                  <a:rPr lang="en-US" sz="2400" dirty="0">
-                    <a:latin typeface="Palatino Linotype" pitchFamily="18" charset="0"/>
-                  </a:rPr>
-                  <a:t>-1.96</a:t>
-                </a:r>
-                <a14:m/>
-                <a:r>
-                  <a:rPr lang="en-US" sz="2400" dirty="0">
-                    <a:latin typeface="Palatino Linotype" pitchFamily="18" charset="0"/>
-                  </a:rPr>
-                  <a:t>]</a:t>
+                  <a:t> is [-1.96]</a:t>
                 </a:r>
               </a:p>
               <a:p>
@@ -10501,21 +10479,7 @@
                   <a:rPr lang="en-US" sz="2000" dirty="0">
                     <a:latin typeface="Palatino Linotype" pitchFamily="18" charset="0"/>
                   </a:rPr>
-                  <a:t>: the probability that the unknown population mean fall into the interval [</a:t>
-                </a:r>
-                <a14:m/>
-                <a:r>
-                  <a:rPr lang="en-US" sz="2000" dirty="0">
-                    <a:latin typeface="Palatino Linotype" pitchFamily="18" charset="0"/>
-                  </a:rPr>
-                  <a:t>-1.96</a:t>
-                </a:r>
-                <a14:m/>
-                <a:r>
-                  <a:rPr lang="en-US" sz="2000" dirty="0">
-                    <a:latin typeface="Palatino Linotype" pitchFamily="18" charset="0"/>
-                  </a:rPr>
-                  <a:t>] is 0.95.</a:t>
+                  <a:t>: the probability that the unknown population mean fall into the interval [-1.96] is 0.95.</a:t>
                 </a:r>
               </a:p>
               <a:p>

</xml_diff>

<commit_message>
add final exam review for statistics
</commit_message>
<xml_diff>
--- a/Lecture 13_Confidence interval/Lecture 13_confidence interval.pptx
+++ b/Lecture 13_Confidence interval/Lecture 13_confidence interval.pptx
@@ -234,7 +234,7 @@
           <a:p>
             <a:fld id="{DDC19DAE-F421-4B83-AF6F-354145FD3FB4}" type="datetimeFigureOut">
               <a:rPr lang="en-US" smtClean="0"/>
-              <a:t>4/3/18</a:t>
+              <a:t>4/30/18</a:t>
             </a:fld>
             <a:endParaRPr lang="en-US"/>
           </a:p>
@@ -1609,7 +1609,7 @@
           <a:p>
             <a:fld id="{1EC348BC-EAD5-416F-A396-0B364132653C}" type="datetime1">
               <a:rPr lang="en-US" smtClean="0"/>
-              <a:t>4/3/18</a:t>
+              <a:t>4/30/18</a:t>
             </a:fld>
             <a:endParaRPr lang="en-US"/>
           </a:p>
@@ -1777,7 +1777,7 @@
           <a:p>
             <a:fld id="{3C6E73F4-B72C-4287-A340-1B6549AADC45}" type="datetime1">
               <a:rPr lang="en-US" smtClean="0"/>
-              <a:t>4/3/18</a:t>
+              <a:t>4/30/18</a:t>
             </a:fld>
             <a:endParaRPr lang="en-US"/>
           </a:p>
@@ -1955,7 +1955,7 @@
           <a:p>
             <a:fld id="{168A3E7B-A300-4342-835A-5799AF340D76}" type="datetime1">
               <a:rPr lang="en-US" smtClean="0"/>
-              <a:t>4/3/18</a:t>
+              <a:t>4/30/18</a:t>
             </a:fld>
             <a:endParaRPr lang="en-US"/>
           </a:p>
@@ -2123,7 +2123,7 @@
           <a:p>
             <a:fld id="{1497E54F-C52A-429D-BBE2-90BBD26F51BB}" type="datetime1">
               <a:rPr lang="en-US" smtClean="0"/>
-              <a:t>4/3/18</a:t>
+              <a:t>4/30/18</a:t>
             </a:fld>
             <a:endParaRPr lang="en-US"/>
           </a:p>
@@ -2368,7 +2368,7 @@
           <a:p>
             <a:fld id="{52CD5DB1-690B-4F50-9529-18B8B796E952}" type="datetime1">
               <a:rPr lang="en-US" smtClean="0"/>
-              <a:t>4/3/18</a:t>
+              <a:t>4/30/18</a:t>
             </a:fld>
             <a:endParaRPr lang="en-US"/>
           </a:p>
@@ -2653,7 +2653,7 @@
           <a:p>
             <a:fld id="{09A389DF-6D12-4D44-BF58-13B38A50B6D7}" type="datetime1">
               <a:rPr lang="en-US" smtClean="0"/>
-              <a:t>4/3/18</a:t>
+              <a:t>4/30/18</a:t>
             </a:fld>
             <a:endParaRPr lang="en-US"/>
           </a:p>
@@ -3072,7 +3072,7 @@
           <a:p>
             <a:fld id="{FEB95709-B389-4A31-A335-4A071080E6A8}" type="datetime1">
               <a:rPr lang="en-US" smtClean="0"/>
-              <a:t>4/3/18</a:t>
+              <a:t>4/30/18</a:t>
             </a:fld>
             <a:endParaRPr lang="en-US"/>
           </a:p>
@@ -3189,7 +3189,7 @@
           <a:p>
             <a:fld id="{91514DB5-E0BE-41C0-8A27-DEF17DEB6233}" type="datetime1">
               <a:rPr lang="en-US" smtClean="0"/>
-              <a:t>4/3/18</a:t>
+              <a:t>4/30/18</a:t>
             </a:fld>
             <a:endParaRPr lang="en-US"/>
           </a:p>
@@ -3284,7 +3284,7 @@
           <a:p>
             <a:fld id="{88A83AC6-E656-4240-BB13-B2170191F3BB}" type="datetime1">
               <a:rPr lang="en-US" smtClean="0"/>
-              <a:t>4/3/18</a:t>
+              <a:t>4/30/18</a:t>
             </a:fld>
             <a:endParaRPr lang="en-US"/>
           </a:p>
@@ -3559,7 +3559,7 @@
           <a:p>
             <a:fld id="{1323A2FE-49B9-4741-AB4C-59C3D5648B31}" type="datetime1">
               <a:rPr lang="en-US" smtClean="0"/>
-              <a:t>4/3/18</a:t>
+              <a:t>4/30/18</a:t>
             </a:fld>
             <a:endParaRPr lang="en-US"/>
           </a:p>
@@ -3811,7 +3811,7 @@
           <a:p>
             <a:fld id="{F700E7DE-5A04-43D1-9717-612C257ADBEF}" type="datetime1">
               <a:rPr lang="en-US" smtClean="0"/>
-              <a:t>4/3/18</a:t>
+              <a:t>4/30/18</a:t>
             </a:fld>
             <a:endParaRPr lang="en-US"/>
           </a:p>
@@ -4022,7 +4022,7 @@
           <a:p>
             <a:fld id="{E4959594-99A2-4C71-9FA1-358E4142533F}" type="datetime1">
               <a:rPr lang="en-US" smtClean="0"/>
-              <a:t>4/3/18</a:t>
+              <a:t>4/30/18</a:t>
             </a:fld>
             <a:endParaRPr lang="en-US"/>
           </a:p>
@@ -4935,7 +4935,7 @@
           <a:graphicData uri="http://schemas.openxmlformats.org/presentationml/2006/ole">
             <mc:AlternateContent xmlns:mc="http://schemas.openxmlformats.org/markup-compatibility/2006">
               <mc:Choice xmlns:v="urn:schemas-microsoft-com:vml" Requires="v">
-                <p:oleObj spid="_x0000_s4142" name="Equation" r:id="rId3" imgW="965160" imgH="419040" progId="Equation.DSMT4">
+                <p:oleObj spid="_x0000_s4149" name="Equation" r:id="rId3" imgW="965160" imgH="419040" progId="Equation.DSMT4">
                   <p:embed/>
                 </p:oleObj>
               </mc:Choice>
@@ -5605,7 +5605,7 @@
           <a:graphicData uri="http://schemas.openxmlformats.org/presentationml/2006/ole">
             <mc:AlternateContent xmlns:mc="http://schemas.openxmlformats.org/markup-compatibility/2006">
               <mc:Choice xmlns:v="urn:schemas-microsoft-com:vml" Requires="v">
-                <p:oleObj spid="_x0000_s5165" name="Equation" r:id="rId4" imgW="583920" imgH="203040" progId="Equation.DSMT4">
+                <p:oleObj spid="_x0000_s5172" name="Equation" r:id="rId4" imgW="583920" imgH="203040" progId="Equation.DSMT4">
                   <p:embed/>
                 </p:oleObj>
               </mc:Choice>
@@ -5871,7 +5871,7 @@
           <a:graphicData uri="http://schemas.openxmlformats.org/presentationml/2006/ole">
             <mc:AlternateContent xmlns:mc="http://schemas.openxmlformats.org/markup-compatibility/2006">
               <mc:Choice xmlns:v="urn:schemas-microsoft-com:vml" Requires="v">
-                <p:oleObj spid="_x0000_s8226" name="Equation" r:id="rId4" imgW="583920" imgH="203040" progId="Equation.DSMT4">
+                <p:oleObj spid="_x0000_s8238" name="Equation" r:id="rId4" imgW="583920" imgH="203040" progId="Equation.DSMT4">
                   <p:embed/>
                 </p:oleObj>
               </mc:Choice>
@@ -5958,7 +5958,7 @@
           <a:graphicData uri="http://schemas.openxmlformats.org/presentationml/2006/ole">
             <mc:AlternateContent xmlns:mc="http://schemas.openxmlformats.org/markup-compatibility/2006">
               <mc:Choice xmlns:v="urn:schemas-microsoft-com:vml" Requires="v">
-                <p:oleObj spid="_x0000_s8227" name="Equation" r:id="rId6" imgW="3276360" imgH="419040" progId="Equation.DSMT4">
+                <p:oleObj spid="_x0000_s8239" name="Equation" r:id="rId6" imgW="3276360" imgH="419040" progId="Equation.DSMT4">
                   <p:embed/>
                 </p:oleObj>
               </mc:Choice>
@@ -8138,7 +8138,7 @@
           <a:graphicData uri="http://schemas.openxmlformats.org/presentationml/2006/ole">
             <mc:AlternateContent xmlns:mc="http://schemas.openxmlformats.org/markup-compatibility/2006">
               <mc:Choice xmlns:v="urn:schemas-microsoft-com:vml" Requires="v">
-                <p:oleObj spid="_x0000_s7202" name="Equation" r:id="rId4" imgW="711000" imgH="431640" progId="Equation.DSMT4">
+                <p:oleObj spid="_x0000_s7209" name="Equation" r:id="rId4" imgW="711000" imgH="431640" progId="Equation.DSMT4">
                   <p:embed/>
                 </p:oleObj>
               </mc:Choice>
@@ -9915,7 +9915,7 @@
           <a:graphicData uri="http://schemas.openxmlformats.org/presentationml/2006/ole">
             <mc:AlternateContent xmlns:mc="http://schemas.openxmlformats.org/markup-compatibility/2006">
               <mc:Choice xmlns:v="urn:schemas-microsoft-com:vml" Requires="v">
-                <p:oleObj spid="_x0000_s3134" name="Equation" r:id="rId5" imgW="228600" imgH="228600" progId="Equation.DSMT4">
+                <p:oleObj spid="_x0000_s3141" name="Equation" r:id="rId5" imgW="228600" imgH="228600" progId="Equation.DSMT4">
                   <p:embed/>
                 </p:oleObj>
               </mc:Choice>
@@ -10207,7 +10207,7 @@
           <a:graphicData uri="http://schemas.openxmlformats.org/presentationml/2006/ole">
             <mc:AlternateContent xmlns:mc="http://schemas.openxmlformats.org/markup-compatibility/2006">
               <mc:Choice xmlns:v="urn:schemas-microsoft-com:vml" Requires="v">
-                <p:oleObj spid="_x0000_s2115" name="Equation" r:id="rId4" imgW="2400120" imgH="457200" progId="Equation.DSMT4">
+                <p:oleObj spid="_x0000_s2122" name="Equation" r:id="rId4" imgW="2400120" imgH="457200" progId="Equation.DSMT4">
                   <p:embed/>
                 </p:oleObj>
               </mc:Choice>

</xml_diff>